<commit_message>
formatted and instruction to activity
</commit_message>
<xml_diff>
--- a/git_vscode_spring26_workshop.pptx
+++ b/git_vscode_spring26_workshop.pptx
@@ -132,14 +132,6 @@
     </p:ext>
   </p:extLst>
 </p:presentation>
-</file>
-
-<file path=ppt/revisionInfo.xml><?xml version="1.0" encoding="utf-8"?>
-<p1510:revInfo xmlns:a="http://schemas.openxmlformats.org/drawingml/2006/main" xmlns:r="http://schemas.openxmlformats.org/officeDocument/2006/relationships" xmlns:p1510="http://schemas.microsoft.com/office/powerpoint/2015/10/main">
-  <p1510:revLst>
-    <p1510:client id="{0213BCB7-741F-AE43-9899-D3C70CCC0B91}" v="188" dt="2026-01-12T19:45:54.558"/>
-  </p1510:revLst>
-</p1510:revInfo>
 </file>
 
 <file path=ppt/slideLayouts/slideLayout1.xml><?xml version="1.0" encoding="utf-8"?>

</xml_diff>